<commit_message>
testing morris without CO2 cap
</commit_message>
<xml_diff>
--- a/Example_Systems/MethodofMorrisExample/OneZone/Intro_to_Method_of_Morris.pptx
+++ b/Example_Systems/MethodofMorrisExample/OneZone/Intro_to_Method_of_Morris.pptx
@@ -15,6 +15,8 @@
     <p:sldId id="259" r:id="rId9"/>
     <p:sldId id="261" r:id="rId10"/>
     <p:sldId id="262" r:id="rId11"/>
+    <p:sldId id="266" r:id="rId12"/>
+    <p:sldId id="267" r:id="rId13"/>
   </p:sldIdLst>
   <p:sldSz cx="12192000" cy="6858000"/>
   <p:notesSz cx="6858000" cy="9144000"/>
@@ -113,6 +115,11 @@
       </a:defRPr>
     </a:lvl9pPr>
   </p:defaultTextStyle>
+  <p:extLst>
+    <p:ext uri="{EFAFB233-063F-42B5-8137-9DF3F51BA10A}">
+      <p15:sldGuideLst xmlns:p15="http://schemas.microsoft.com/office/powerpoint/2012/main"/>
+    </p:ext>
+  </p:extLst>
 </p:presentation>
 </file>
 
@@ -3446,7 +3453,7 @@
           <a:p>
             <a:fld id="{3957017E-8E2E-1940-99EF-BC86639AAF15}" type="datetimeFigureOut">
               <a:rPr lang="en-US" smtClean="0"/>
-              <a:t>9/26/21</a:t>
+              <a:t>9/27/21</a:t>
             </a:fld>
             <a:endParaRPr lang="en-US"/>
           </a:p>
@@ -3644,7 +3651,7 @@
           <a:p>
             <a:fld id="{3957017E-8E2E-1940-99EF-BC86639AAF15}" type="datetimeFigureOut">
               <a:rPr lang="en-US" smtClean="0"/>
-              <a:t>9/26/21</a:t>
+              <a:t>9/27/21</a:t>
             </a:fld>
             <a:endParaRPr lang="en-US"/>
           </a:p>
@@ -3852,7 +3859,7 @@
           <a:p>
             <a:fld id="{3957017E-8E2E-1940-99EF-BC86639AAF15}" type="datetimeFigureOut">
               <a:rPr lang="en-US" smtClean="0"/>
-              <a:t>9/26/21</a:t>
+              <a:t>9/27/21</a:t>
             </a:fld>
             <a:endParaRPr lang="en-US"/>
           </a:p>
@@ -4050,7 +4057,7 @@
           <a:p>
             <a:fld id="{3957017E-8E2E-1940-99EF-BC86639AAF15}" type="datetimeFigureOut">
               <a:rPr lang="en-US" smtClean="0"/>
-              <a:t>9/26/21</a:t>
+              <a:t>9/27/21</a:t>
             </a:fld>
             <a:endParaRPr lang="en-US"/>
           </a:p>
@@ -4325,7 +4332,7 @@
           <a:p>
             <a:fld id="{3957017E-8E2E-1940-99EF-BC86639AAF15}" type="datetimeFigureOut">
               <a:rPr lang="en-US" smtClean="0"/>
-              <a:t>9/26/21</a:t>
+              <a:t>9/27/21</a:t>
             </a:fld>
             <a:endParaRPr lang="en-US"/>
           </a:p>
@@ -4590,7 +4597,7 @@
           <a:p>
             <a:fld id="{3957017E-8E2E-1940-99EF-BC86639AAF15}" type="datetimeFigureOut">
               <a:rPr lang="en-US" smtClean="0"/>
-              <a:t>9/26/21</a:t>
+              <a:t>9/27/21</a:t>
             </a:fld>
             <a:endParaRPr lang="en-US"/>
           </a:p>
@@ -5002,7 +5009,7 @@
           <a:p>
             <a:fld id="{3957017E-8E2E-1940-99EF-BC86639AAF15}" type="datetimeFigureOut">
               <a:rPr lang="en-US" smtClean="0"/>
-              <a:t>9/26/21</a:t>
+              <a:t>9/27/21</a:t>
             </a:fld>
             <a:endParaRPr lang="en-US"/>
           </a:p>
@@ -5143,7 +5150,7 @@
           <a:p>
             <a:fld id="{3957017E-8E2E-1940-99EF-BC86639AAF15}" type="datetimeFigureOut">
               <a:rPr lang="en-US" smtClean="0"/>
-              <a:t>9/26/21</a:t>
+              <a:t>9/27/21</a:t>
             </a:fld>
             <a:endParaRPr lang="en-US"/>
           </a:p>
@@ -5256,7 +5263,7 @@
           <a:p>
             <a:fld id="{3957017E-8E2E-1940-99EF-BC86639AAF15}" type="datetimeFigureOut">
               <a:rPr lang="en-US" smtClean="0"/>
-              <a:t>9/26/21</a:t>
+              <a:t>9/27/21</a:t>
             </a:fld>
             <a:endParaRPr lang="en-US"/>
           </a:p>
@@ -5567,7 +5574,7 @@
           <a:p>
             <a:fld id="{3957017E-8E2E-1940-99EF-BC86639AAF15}" type="datetimeFigureOut">
               <a:rPr lang="en-US" smtClean="0"/>
-              <a:t>9/26/21</a:t>
+              <a:t>9/27/21</a:t>
             </a:fld>
             <a:endParaRPr lang="en-US"/>
           </a:p>
@@ -5855,7 +5862,7 @@
           <a:p>
             <a:fld id="{3957017E-8E2E-1940-99EF-BC86639AAF15}" type="datetimeFigureOut">
               <a:rPr lang="en-US" smtClean="0"/>
-              <a:t>9/26/21</a:t>
+              <a:t>9/27/21</a:t>
             </a:fld>
             <a:endParaRPr lang="en-US"/>
           </a:p>
@@ -6096,7 +6103,7 @@
           <a:p>
             <a:fld id="{3957017E-8E2E-1940-99EF-BC86639AAF15}" type="datetimeFigureOut">
               <a:rPr lang="en-US" smtClean="0"/>
-              <a:t>9/26/21</a:t>
+              <a:t>9/27/21</a:t>
             </a:fld>
             <a:endParaRPr lang="en-US"/>
           </a:p>
@@ -6499,6 +6506,14 @@
 <file path=ppt/slides/slide1.xml><?xml version="1.0" encoding="utf-8"?>
 <p:sld xmlns:a="http://schemas.openxmlformats.org/drawingml/2006/main" xmlns:r="http://schemas.openxmlformats.org/officeDocument/2006/relationships" xmlns:p="http://schemas.openxmlformats.org/presentationml/2006/main">
   <p:cSld>
+    <p:bg>
+      <p:bgPr>
+        <a:solidFill>
+          <a:schemeClr val="bg1"/>
+        </a:solidFill>
+        <a:effectLst/>
+      </p:bgPr>
+    </p:bg>
     <p:spTree>
       <p:nvGrpSpPr>
         <p:cNvPr id="1" name=""/>
@@ -6513,6 +6528,457 @@
           <a:chExt cx="0" cy="0"/>
         </a:xfrm>
       </p:grpSpPr>
+      <p:sp useBgFill="1">
+        <p:nvSpPr>
+          <p:cNvPr id="8" name="Rectangle 7">
+            <a:extLst>
+              <a:ext uri="{FF2B5EF4-FFF2-40B4-BE49-F238E27FC236}">
+                <a16:creationId xmlns:a16="http://schemas.microsoft.com/office/drawing/2014/main" id="{FFD48BC7-DC40-47DE-87EE-9F4B6ECB9ABB}"/>
+              </a:ext>
+              <a:ext uri="{C183D7F6-B498-43B3-948B-1728B52AA6E4}">
+                <adec:decorative xmlns:adec="http://schemas.microsoft.com/office/drawing/2017/decorative" val="1"/>
+              </a:ext>
+            </a:extLst>
+          </p:cNvPr>
+          <p:cNvSpPr>
+            <a:spLocks noGrp="1" noRot="1" noChangeAspect="1" noMove="1" noResize="1" noEditPoints="1" noAdjustHandles="1" noChangeArrowheads="1" noChangeShapeType="1" noTextEdit="1"/>
+          </p:cNvSpPr>
+          <p:nvPr>
+            <p:extLst>
+              <p:ext uri="{386F3935-93C4-4BCD-93E2-E3B085C9AB24}">
+                <p16:designElem xmlns:p16="http://schemas.microsoft.com/office/powerpoint/2015/main" val="1"/>
+              </p:ext>
+            </p:extLst>
+          </p:nvPr>
+        </p:nvSpPr>
+        <p:spPr>
+          <a:xfrm>
+            <a:off x="0" y="0"/>
+            <a:ext cx="12192000" cy="6858000"/>
+          </a:xfrm>
+          <a:prstGeom prst="rect">
+            <a:avLst/>
+          </a:prstGeom>
+          <a:ln>
+            <a:noFill/>
+          </a:ln>
+        </p:spPr>
+        <p:style>
+          <a:lnRef idx="2">
+            <a:schemeClr val="accent1">
+              <a:shade val="50000"/>
+            </a:schemeClr>
+          </a:lnRef>
+          <a:fillRef idx="1">
+            <a:schemeClr val="accent1"/>
+          </a:fillRef>
+          <a:effectRef idx="0">
+            <a:schemeClr val="accent1"/>
+          </a:effectRef>
+          <a:fontRef idx="minor">
+            <a:schemeClr val="lt1"/>
+          </a:fontRef>
+        </p:style>
+        <p:txBody>
+          <a:bodyPr rtlCol="0" anchor="ctr"/>
+          <a:lstStyle/>
+          <a:p>
+            <a:pPr algn="ctr"/>
+            <a:endParaRPr lang="en-US"/>
+          </a:p>
+        </p:txBody>
+      </p:sp>
+      <p:sp useBgFill="1">
+        <p:nvSpPr>
+          <p:cNvPr id="10" name="Freeform: Shape 9">
+            <a:extLst>
+              <a:ext uri="{FF2B5EF4-FFF2-40B4-BE49-F238E27FC236}">
+                <a16:creationId xmlns:a16="http://schemas.microsoft.com/office/drawing/2014/main" id="{E502BBC7-2C76-46F3-BC24-5985BC13DB88}"/>
+              </a:ext>
+              <a:ext uri="{C183D7F6-B498-43B3-948B-1728B52AA6E4}">
+                <adec:decorative xmlns:adec="http://schemas.microsoft.com/office/drawing/2017/decorative" val="1"/>
+              </a:ext>
+            </a:extLst>
+          </p:cNvPr>
+          <p:cNvSpPr>
+            <a:spLocks noGrp="1" noRot="1" noChangeAspect="1" noMove="1" noResize="1" noEditPoints="1" noAdjustHandles="1" noChangeArrowheads="1" noChangeShapeType="1" noTextEdit="1"/>
+          </p:cNvSpPr>
+          <p:nvPr>
+            <p:extLst>
+              <p:ext uri="{386F3935-93C4-4BCD-93E2-E3B085C9AB24}">
+                <p16:designElem xmlns:p16="http://schemas.microsoft.com/office/powerpoint/2015/main" val="1"/>
+              </p:ext>
+            </p:extLst>
+          </p:nvPr>
+        </p:nvSpPr>
+        <p:spPr>
+          <a:xfrm>
+            <a:off x="1114425" y="0"/>
+            <a:ext cx="9963150" cy="6858000"/>
+          </a:xfrm>
+          <a:custGeom>
+            <a:avLst/>
+            <a:gdLst>
+              <a:gd name="connsiteX0" fmla="*/ 1595771 w 9963150"/>
+              <a:gd name="connsiteY0" fmla="*/ 0 h 6858000"/>
+              <a:gd name="connsiteX1" fmla="*/ 8367379 w 9963150"/>
+              <a:gd name="connsiteY1" fmla="*/ 0 h 6858000"/>
+              <a:gd name="connsiteX2" fmla="*/ 8504080 w 9963150"/>
+              <a:gd name="connsiteY2" fmla="*/ 130333 h 6858000"/>
+              <a:gd name="connsiteX3" fmla="*/ 9963150 w 9963150"/>
+              <a:gd name="connsiteY3" fmla="*/ 3652838 h 6858000"/>
+              <a:gd name="connsiteX4" fmla="*/ 8825600 w 9963150"/>
+              <a:gd name="connsiteY4" fmla="*/ 6821583 h 6858000"/>
+              <a:gd name="connsiteX5" fmla="*/ 8794055 w 9963150"/>
+              <a:gd name="connsiteY5" fmla="*/ 6858000 h 6858000"/>
+              <a:gd name="connsiteX6" fmla="*/ 1169096 w 9963150"/>
+              <a:gd name="connsiteY6" fmla="*/ 6858000 h 6858000"/>
+              <a:gd name="connsiteX7" fmla="*/ 1137550 w 9963150"/>
+              <a:gd name="connsiteY7" fmla="*/ 6821583 h 6858000"/>
+              <a:gd name="connsiteX8" fmla="*/ 0 w 9963150"/>
+              <a:gd name="connsiteY8" fmla="*/ 3652838 h 6858000"/>
+              <a:gd name="connsiteX9" fmla="*/ 1459070 w 9963150"/>
+              <a:gd name="connsiteY9" fmla="*/ 130333 h 6858000"/>
+            </a:gdLst>
+            <a:ahLst/>
+            <a:cxnLst>
+              <a:cxn ang="0">
+                <a:pos x="connsiteX0" y="connsiteY0"/>
+              </a:cxn>
+              <a:cxn ang="0">
+                <a:pos x="connsiteX1" y="connsiteY1"/>
+              </a:cxn>
+              <a:cxn ang="0">
+                <a:pos x="connsiteX2" y="connsiteY2"/>
+              </a:cxn>
+              <a:cxn ang="0">
+                <a:pos x="connsiteX3" y="connsiteY3"/>
+              </a:cxn>
+              <a:cxn ang="0">
+                <a:pos x="connsiteX4" y="connsiteY4"/>
+              </a:cxn>
+              <a:cxn ang="0">
+                <a:pos x="connsiteX5" y="connsiteY5"/>
+              </a:cxn>
+              <a:cxn ang="0">
+                <a:pos x="connsiteX6" y="connsiteY6"/>
+              </a:cxn>
+              <a:cxn ang="0">
+                <a:pos x="connsiteX7" y="connsiteY7"/>
+              </a:cxn>
+              <a:cxn ang="0">
+                <a:pos x="connsiteX8" y="connsiteY8"/>
+              </a:cxn>
+              <a:cxn ang="0">
+                <a:pos x="connsiteX9" y="connsiteY9"/>
+              </a:cxn>
+            </a:cxnLst>
+            <a:rect l="l" t="t" r="r" b="b"/>
+            <a:pathLst>
+              <a:path w="9963150" h="6858000">
+                <a:moveTo>
+                  <a:pt x="1595771" y="0"/>
+                </a:moveTo>
+                <a:lnTo>
+                  <a:pt x="8367379" y="0"/>
+                </a:lnTo>
+                <a:lnTo>
+                  <a:pt x="8504080" y="130333"/>
+                </a:lnTo>
+                <a:cubicBezTo>
+                  <a:pt x="9405568" y="1031820"/>
+                  <a:pt x="9963150" y="2277214"/>
+                  <a:pt x="9963150" y="3652838"/>
+                </a:cubicBezTo>
+                <a:cubicBezTo>
+                  <a:pt x="9963150" y="4856509"/>
+                  <a:pt x="9536251" y="5960473"/>
+                  <a:pt x="8825600" y="6821583"/>
+                </a:cubicBezTo>
+                <a:lnTo>
+                  <a:pt x="8794055" y="6858000"/>
+                </a:lnTo>
+                <a:lnTo>
+                  <a:pt x="1169096" y="6858000"/>
+                </a:lnTo>
+                <a:lnTo>
+                  <a:pt x="1137550" y="6821583"/>
+                </a:lnTo>
+                <a:cubicBezTo>
+                  <a:pt x="426899" y="5960473"/>
+                  <a:pt x="0" y="4856509"/>
+                  <a:pt x="0" y="3652838"/>
+                </a:cubicBezTo>
+                <a:cubicBezTo>
+                  <a:pt x="0" y="2277214"/>
+                  <a:pt x="557582" y="1031820"/>
+                  <a:pt x="1459070" y="130333"/>
+                </a:cubicBezTo>
+                <a:close/>
+              </a:path>
+            </a:pathLst>
+          </a:custGeom>
+          <a:ln w="9525">
+            <a:solidFill>
+              <a:srgbClr val="EFEFEF"/>
+            </a:solidFill>
+          </a:ln>
+          <a:effectLst>
+            <a:outerShdw blurRad="139700" sx="102000" sy="102000" algn="ctr" rotWithShape="0">
+              <a:schemeClr val="bg1">
+                <a:lumMod val="85000"/>
+                <a:alpha val="38000"/>
+              </a:schemeClr>
+            </a:outerShdw>
+          </a:effectLst>
+        </p:spPr>
+        <p:style>
+          <a:lnRef idx="2">
+            <a:schemeClr val="accent1">
+              <a:shade val="50000"/>
+            </a:schemeClr>
+          </a:lnRef>
+          <a:fillRef idx="1">
+            <a:schemeClr val="accent1"/>
+          </a:fillRef>
+          <a:effectRef idx="0">
+            <a:schemeClr val="accent1"/>
+          </a:effectRef>
+          <a:fontRef idx="minor">
+            <a:schemeClr val="lt1"/>
+          </a:fontRef>
+        </p:style>
+        <p:txBody>
+          <a:bodyPr wrap="square" rtlCol="0" anchor="ctr">
+            <a:noAutofit/>
+          </a:bodyPr>
+          <a:lstStyle/>
+          <a:p>
+            <a:pPr marL="0" marR="0" lvl="0" indent="0" algn="ctr" defTabSz="914400" rtl="0" eaLnBrk="1" fontAlgn="auto" latinLnBrk="0" hangingPunct="1">
+              <a:lnSpc>
+                <a:spcPct val="100000"/>
+              </a:lnSpc>
+              <a:spcBef>
+                <a:spcPts val="0"/>
+              </a:spcBef>
+              <a:spcAft>
+                <a:spcPts val="0"/>
+              </a:spcAft>
+              <a:buClrTx/>
+              <a:buSzTx/>
+              <a:buFontTx/>
+              <a:buNone/>
+              <a:tabLst/>
+              <a:defRPr/>
+            </a:pPr>
+            <a:endParaRPr kumimoji="0" lang="en-US" sz="1800" b="0" i="0" u="none" strike="noStrike" kern="1200" cap="none" spc="0" normalizeH="0" baseline="0" noProof="0">
+              <a:ln>
+                <a:noFill/>
+              </a:ln>
+              <a:solidFill>
+                <a:prstClr val="white"/>
+              </a:solidFill>
+              <a:effectLst/>
+              <a:uLnTx/>
+              <a:uFillTx/>
+              <a:latin typeface="Calibri" panose="020F0502020204030204"/>
+              <a:ea typeface="+mn-ea"/>
+              <a:cs typeface="+mn-cs"/>
+            </a:endParaRPr>
+          </a:p>
+        </p:txBody>
+      </p:sp>
+      <p:sp useBgFill="1">
+        <p:nvSpPr>
+          <p:cNvPr id="12" name="Freeform: Shape 11">
+            <a:extLst>
+              <a:ext uri="{FF2B5EF4-FFF2-40B4-BE49-F238E27FC236}">
+                <a16:creationId xmlns:a16="http://schemas.microsoft.com/office/drawing/2014/main" id="{C7F28D52-2A5F-4D23-81AE-7CB8B591C7AF}"/>
+              </a:ext>
+              <a:ext uri="{C183D7F6-B498-43B3-948B-1728B52AA6E4}">
+                <adec:decorative xmlns:adec="http://schemas.microsoft.com/office/drawing/2017/decorative" val="1"/>
+              </a:ext>
+            </a:extLst>
+          </p:cNvPr>
+          <p:cNvSpPr>
+            <a:spLocks noGrp="1" noRot="1" noChangeAspect="1" noMove="1" noResize="1" noEditPoints="1" noAdjustHandles="1" noChangeArrowheads="1" noChangeShapeType="1" noTextEdit="1"/>
+          </p:cNvSpPr>
+          <p:nvPr>
+            <p:extLst>
+              <p:ext uri="{386F3935-93C4-4BCD-93E2-E3B085C9AB24}">
+                <p16:designElem xmlns:p16="http://schemas.microsoft.com/office/powerpoint/2015/main" val="1"/>
+              </p:ext>
+            </p:extLst>
+          </p:nvPr>
+        </p:nvSpPr>
+        <p:spPr>
+          <a:xfrm>
+            <a:off x="1121664" y="0"/>
+            <a:ext cx="9948672" cy="6858000"/>
+          </a:xfrm>
+          <a:custGeom>
+            <a:avLst/>
+            <a:gdLst>
+              <a:gd name="connsiteX0" fmla="*/ 1595771 w 9963150"/>
+              <a:gd name="connsiteY0" fmla="*/ 0 h 6858000"/>
+              <a:gd name="connsiteX1" fmla="*/ 8367379 w 9963150"/>
+              <a:gd name="connsiteY1" fmla="*/ 0 h 6858000"/>
+              <a:gd name="connsiteX2" fmla="*/ 8504080 w 9963150"/>
+              <a:gd name="connsiteY2" fmla="*/ 130333 h 6858000"/>
+              <a:gd name="connsiteX3" fmla="*/ 9963150 w 9963150"/>
+              <a:gd name="connsiteY3" fmla="*/ 3652838 h 6858000"/>
+              <a:gd name="connsiteX4" fmla="*/ 8825600 w 9963150"/>
+              <a:gd name="connsiteY4" fmla="*/ 6821583 h 6858000"/>
+              <a:gd name="connsiteX5" fmla="*/ 8794055 w 9963150"/>
+              <a:gd name="connsiteY5" fmla="*/ 6858000 h 6858000"/>
+              <a:gd name="connsiteX6" fmla="*/ 1169096 w 9963150"/>
+              <a:gd name="connsiteY6" fmla="*/ 6858000 h 6858000"/>
+              <a:gd name="connsiteX7" fmla="*/ 1137550 w 9963150"/>
+              <a:gd name="connsiteY7" fmla="*/ 6821583 h 6858000"/>
+              <a:gd name="connsiteX8" fmla="*/ 0 w 9963150"/>
+              <a:gd name="connsiteY8" fmla="*/ 3652838 h 6858000"/>
+              <a:gd name="connsiteX9" fmla="*/ 1459070 w 9963150"/>
+              <a:gd name="connsiteY9" fmla="*/ 130333 h 6858000"/>
+            </a:gdLst>
+            <a:ahLst/>
+            <a:cxnLst>
+              <a:cxn ang="0">
+                <a:pos x="connsiteX0" y="connsiteY0"/>
+              </a:cxn>
+              <a:cxn ang="0">
+                <a:pos x="connsiteX1" y="connsiteY1"/>
+              </a:cxn>
+              <a:cxn ang="0">
+                <a:pos x="connsiteX2" y="connsiteY2"/>
+              </a:cxn>
+              <a:cxn ang="0">
+                <a:pos x="connsiteX3" y="connsiteY3"/>
+              </a:cxn>
+              <a:cxn ang="0">
+                <a:pos x="connsiteX4" y="connsiteY4"/>
+              </a:cxn>
+              <a:cxn ang="0">
+                <a:pos x="connsiteX5" y="connsiteY5"/>
+              </a:cxn>
+              <a:cxn ang="0">
+                <a:pos x="connsiteX6" y="connsiteY6"/>
+              </a:cxn>
+              <a:cxn ang="0">
+                <a:pos x="connsiteX7" y="connsiteY7"/>
+              </a:cxn>
+              <a:cxn ang="0">
+                <a:pos x="connsiteX8" y="connsiteY8"/>
+              </a:cxn>
+              <a:cxn ang="0">
+                <a:pos x="connsiteX9" y="connsiteY9"/>
+              </a:cxn>
+            </a:cxnLst>
+            <a:rect l="l" t="t" r="r" b="b"/>
+            <a:pathLst>
+              <a:path w="9963150" h="6858000">
+                <a:moveTo>
+                  <a:pt x="1595771" y="0"/>
+                </a:moveTo>
+                <a:lnTo>
+                  <a:pt x="8367379" y="0"/>
+                </a:lnTo>
+                <a:lnTo>
+                  <a:pt x="8504080" y="130333"/>
+                </a:lnTo>
+                <a:cubicBezTo>
+                  <a:pt x="9405568" y="1031820"/>
+                  <a:pt x="9963150" y="2277214"/>
+                  <a:pt x="9963150" y="3652838"/>
+                </a:cubicBezTo>
+                <a:cubicBezTo>
+                  <a:pt x="9963150" y="4856509"/>
+                  <a:pt x="9536251" y="5960473"/>
+                  <a:pt x="8825600" y="6821583"/>
+                </a:cubicBezTo>
+                <a:lnTo>
+                  <a:pt x="8794055" y="6858000"/>
+                </a:lnTo>
+                <a:lnTo>
+                  <a:pt x="1169096" y="6858000"/>
+                </a:lnTo>
+                <a:lnTo>
+                  <a:pt x="1137550" y="6821583"/>
+                </a:lnTo>
+                <a:cubicBezTo>
+                  <a:pt x="426899" y="5960473"/>
+                  <a:pt x="0" y="4856509"/>
+                  <a:pt x="0" y="3652838"/>
+                </a:cubicBezTo>
+                <a:cubicBezTo>
+                  <a:pt x="0" y="2277214"/>
+                  <a:pt x="557582" y="1031820"/>
+                  <a:pt x="1459070" y="130333"/>
+                </a:cubicBezTo>
+                <a:close/>
+              </a:path>
+            </a:pathLst>
+          </a:custGeom>
+          <a:ln w="9525">
+            <a:noFill/>
+          </a:ln>
+          <a:effectLst/>
+        </p:spPr>
+        <p:style>
+          <a:lnRef idx="2">
+            <a:schemeClr val="accent1">
+              <a:shade val="50000"/>
+            </a:schemeClr>
+          </a:lnRef>
+          <a:fillRef idx="1">
+            <a:schemeClr val="accent1"/>
+          </a:fillRef>
+          <a:effectRef idx="0">
+            <a:schemeClr val="accent1"/>
+          </a:effectRef>
+          <a:fontRef idx="minor">
+            <a:schemeClr val="lt1"/>
+          </a:fontRef>
+        </p:style>
+        <p:txBody>
+          <a:bodyPr wrap="square" rtlCol="0" anchor="ctr">
+            <a:noAutofit/>
+          </a:bodyPr>
+          <a:lstStyle/>
+          <a:p>
+            <a:pPr marL="0" marR="0" lvl="0" indent="0" algn="ctr" defTabSz="914400" rtl="0" eaLnBrk="1" fontAlgn="auto" latinLnBrk="0" hangingPunct="1">
+              <a:lnSpc>
+                <a:spcPct val="100000"/>
+              </a:lnSpc>
+              <a:spcBef>
+                <a:spcPts val="0"/>
+              </a:spcBef>
+              <a:spcAft>
+                <a:spcPts val="0"/>
+              </a:spcAft>
+              <a:buClrTx/>
+              <a:buSzTx/>
+              <a:buFontTx/>
+              <a:buNone/>
+              <a:tabLst/>
+              <a:defRPr/>
+            </a:pPr>
+            <a:endParaRPr kumimoji="0" lang="en-US" sz="1800" b="0" i="0" u="none" strike="noStrike" kern="1200" cap="none" spc="0" normalizeH="0" baseline="0" noProof="0">
+              <a:ln>
+                <a:noFill/>
+              </a:ln>
+              <a:solidFill>
+                <a:prstClr val="white"/>
+              </a:solidFill>
+              <a:effectLst/>
+              <a:uLnTx/>
+              <a:uFillTx/>
+              <a:latin typeface="Calibri" panose="020F0502020204030204"/>
+              <a:ea typeface="+mn-ea"/>
+              <a:cs typeface="+mn-cs"/>
+            </a:endParaRPr>
+          </a:p>
+        </p:txBody>
+      </p:sp>
       <p:sp>
         <p:nvSpPr>
           <p:cNvPr id="2" name="Title 1">
@@ -6529,13 +6995,20 @@
             <p:ph type="ctrTitle"/>
           </p:nvPr>
         </p:nvSpPr>
-        <p:spPr/>
+        <p:spPr>
+          <a:xfrm>
+            <a:off x="1524003" y="1999615"/>
+            <a:ext cx="9144000" cy="2764028"/>
+          </a:xfrm>
+        </p:spPr>
         <p:txBody>
-          <a:bodyPr/>
+          <a:bodyPr anchor="ctr">
+            <a:normAutofit/>
+          </a:bodyPr>
           <a:lstStyle/>
           <a:p>
             <a:r>
-              <a:rPr lang="en-US" dirty="0"/>
+              <a:rPr lang="en-US" sz="7200"/>
               <a:t>Method of Morris Algo</a:t>
             </a:r>
           </a:p>
@@ -6557,15 +7030,114 @@
             <p:ph type="subTitle" idx="1"/>
           </p:nvPr>
         </p:nvSpPr>
-        <p:spPr/>
+        <p:spPr>
+          <a:xfrm>
+            <a:off x="1966912" y="5645150"/>
+            <a:ext cx="8258176" cy="631825"/>
+          </a:xfrm>
+        </p:spPr>
         <p:txBody>
-          <a:bodyPr/>
+          <a:bodyPr anchor="ctr">
+            <a:normAutofit/>
+          </a:bodyPr>
           <a:lstStyle/>
           <a:p>
             <a:r>
-              <a:rPr lang="en-US" dirty="0"/>
+              <a:rPr lang="en-US" sz="2800"/>
               <a:t>9/26/21</a:t>
             </a:r>
+          </a:p>
+        </p:txBody>
+      </p:sp>
+      <p:sp>
+        <p:nvSpPr>
+          <p:cNvPr id="14" name="Rectangle 13">
+            <a:extLst>
+              <a:ext uri="{FF2B5EF4-FFF2-40B4-BE49-F238E27FC236}">
+                <a16:creationId xmlns:a16="http://schemas.microsoft.com/office/drawing/2014/main" id="{3629484E-3792-4B3D-89AD-7C8A1ED0E0D4}"/>
+              </a:ext>
+              <a:ext uri="{C183D7F6-B498-43B3-948B-1728B52AA6E4}">
+                <adec:decorative xmlns:adec="http://schemas.microsoft.com/office/drawing/2017/decorative" val="1"/>
+              </a:ext>
+            </a:extLst>
+          </p:cNvPr>
+          <p:cNvSpPr>
+            <a:spLocks noGrp="1" noRot="1" noChangeAspect="1" noMove="1" noResize="1" noEditPoints="1" noAdjustHandles="1" noChangeArrowheads="1" noChangeShapeType="1" noTextEdit="1"/>
+          </p:cNvSpPr>
+          <p:nvPr>
+            <p:extLst>
+              <p:ext uri="{386F3935-93C4-4BCD-93E2-E3B085C9AB24}">
+                <p16:designElem xmlns:p16="http://schemas.microsoft.com/office/powerpoint/2015/main" val="1"/>
+              </p:ext>
+            </p:extLst>
+          </p:nvPr>
+        </p:nvSpPr>
+        <p:spPr>
+          <a:xfrm>
+            <a:off x="3718560" y="5524786"/>
+            <a:ext cx="4754880" cy="27432"/>
+          </a:xfrm>
+          <a:prstGeom prst="rect">
+            <a:avLst/>
+          </a:prstGeom>
+          <a:solidFill>
+            <a:schemeClr val="accent2"/>
+          </a:solidFill>
+          <a:ln>
+            <a:noFill/>
+          </a:ln>
+        </p:spPr>
+        <p:style>
+          <a:lnRef idx="2">
+            <a:schemeClr val="accent1">
+              <a:shade val="50000"/>
+            </a:schemeClr>
+          </a:lnRef>
+          <a:fillRef idx="1">
+            <a:schemeClr val="accent1"/>
+          </a:fillRef>
+          <a:effectRef idx="0">
+            <a:schemeClr val="accent1"/>
+          </a:effectRef>
+          <a:fontRef idx="minor">
+            <a:schemeClr val="lt1"/>
+          </a:fontRef>
+        </p:style>
+        <p:txBody>
+          <a:bodyPr rtlCol="0" anchor="ctr"/>
+          <a:lstStyle/>
+          <a:p>
+            <a:pPr marL="0" marR="0" lvl="0" indent="0" algn="ctr" defTabSz="914400" rtl="0" eaLnBrk="1" fontAlgn="auto" latinLnBrk="0" hangingPunct="1">
+              <a:lnSpc>
+                <a:spcPct val="100000"/>
+              </a:lnSpc>
+              <a:spcBef>
+                <a:spcPts val="0"/>
+              </a:spcBef>
+              <a:spcAft>
+                <a:spcPts val="0"/>
+              </a:spcAft>
+              <a:buClrTx/>
+              <a:buSzTx/>
+              <a:buFontTx/>
+              <a:buNone/>
+              <a:tabLst/>
+              <a:defRPr/>
+            </a:pPr>
+            <a:endParaRPr kumimoji="0" lang="en-US" sz="1800" b="0" i="0" u="none" strike="noStrike" kern="1200" cap="none" spc="0" normalizeH="0" baseline="0" noProof="0">
+              <a:ln>
+                <a:noFill/>
+              </a:ln>
+              <a:solidFill>
+                <a:prstClr val="white"/>
+              </a:solidFill>
+              <a:effectLst/>
+              <a:uLnTx/>
+              <a:uFillTx/>
+              <a:latin typeface="Calibri" panose="020F0502020204030204"/>
+              <a:ea typeface="+mn-ea"/>
+              <a:cs typeface="+mn-cs"/>
+            </a:endParaRPr>
           </a:p>
         </p:txBody>
       </p:sp>
@@ -6707,7 +7279,7 @@
 </p:sld>
 </file>
 
-<file path=ppt/slides/slide2.xml><?xml version="1.0" encoding="utf-8"?>
+<file path=ppt/slides/slide11.xml><?xml version="1.0" encoding="utf-8"?>
 <p:sld xmlns:a="http://schemas.openxmlformats.org/drawingml/2006/main" xmlns:r="http://schemas.openxmlformats.org/officeDocument/2006/relationships" xmlns:p="http://schemas.openxmlformats.org/presentationml/2006/main">
   <p:cSld>
     <p:spTree>
@@ -6729,7 +7301,7 @@
           <p:cNvPr id="2" name="Title 1">
             <a:extLst>
               <a:ext uri="{FF2B5EF4-FFF2-40B4-BE49-F238E27FC236}">
-                <a16:creationId xmlns:a16="http://schemas.microsoft.com/office/drawing/2014/main" id="{6FEE9870-82B6-5744-B0E8-3C959D92333D}"/>
+                <a16:creationId xmlns:a16="http://schemas.microsoft.com/office/drawing/2014/main" id="{D6108591-8888-314C-BDB1-18770039CE62}"/>
               </a:ext>
             </a:extLst>
           </p:cNvPr>
@@ -6747,6 +7319,691 @@
           <a:p>
             <a:r>
               <a:rPr lang="en-US" dirty="0"/>
+              <a:t>Sample results</a:t>
+            </a:r>
+          </a:p>
+        </p:txBody>
+      </p:sp>
+      <p:sp>
+        <p:nvSpPr>
+          <p:cNvPr id="3" name="Text Placeholder 2">
+            <a:extLst>
+              <a:ext uri="{FF2B5EF4-FFF2-40B4-BE49-F238E27FC236}">
+                <a16:creationId xmlns:a16="http://schemas.microsoft.com/office/drawing/2014/main" id="{4128B436-767C-9744-8BB2-8018D095E5C0}"/>
+              </a:ext>
+            </a:extLst>
+          </p:cNvPr>
+          <p:cNvSpPr>
+            <a:spLocks noGrp="1"/>
+          </p:cNvSpPr>
+          <p:nvPr>
+            <p:ph type="body" idx="1"/>
+          </p:nvPr>
+        </p:nvSpPr>
+        <p:spPr/>
+        <p:txBody>
+          <a:bodyPr/>
+          <a:lstStyle/>
+          <a:p>
+            <a:r>
+              <a:rPr lang="en-US" dirty="0"/>
+              <a:t>Without CO2 Cap</a:t>
+            </a:r>
+          </a:p>
+        </p:txBody>
+      </p:sp>
+    </p:spTree>
+    <p:extLst>
+      <p:ext uri="{BB962C8B-B14F-4D97-AF65-F5344CB8AC3E}">
+        <p14:creationId xmlns:p14="http://schemas.microsoft.com/office/powerpoint/2010/main" val="1990853486"/>
+      </p:ext>
+    </p:extLst>
+  </p:cSld>
+  <p:clrMapOvr>
+    <a:masterClrMapping/>
+  </p:clrMapOvr>
+</p:sld>
+</file>
+
+<file path=ppt/slides/slide12.xml><?xml version="1.0" encoding="utf-8"?>
+<p:sld xmlns:a="http://schemas.openxmlformats.org/drawingml/2006/main" xmlns:r="http://schemas.openxmlformats.org/officeDocument/2006/relationships" xmlns:p="http://schemas.openxmlformats.org/presentationml/2006/main">
+  <p:cSld>
+    <p:spTree>
+      <p:nvGrpSpPr>
+        <p:cNvPr id="1" name=""/>
+        <p:cNvGrpSpPr/>
+        <p:nvPr/>
+      </p:nvGrpSpPr>
+      <p:grpSpPr>
+        <a:xfrm>
+          <a:off x="0" y="0"/>
+          <a:ext cx="0" cy="0"/>
+          <a:chOff x="0" y="0"/>
+          <a:chExt cx="0" cy="0"/>
+        </a:xfrm>
+      </p:grpSpPr>
+      <p:pic>
+        <p:nvPicPr>
+          <p:cNvPr id="2" name="Picture 1" descr="Table&#10;&#10;Description automatically generated">
+            <a:extLst>
+              <a:ext uri="{FF2B5EF4-FFF2-40B4-BE49-F238E27FC236}">
+                <a16:creationId xmlns:a16="http://schemas.microsoft.com/office/drawing/2014/main" id="{4692BCA7-F53E-1049-A40E-CFB43D1398A4}"/>
+              </a:ext>
+            </a:extLst>
+          </p:cNvPr>
+          <p:cNvPicPr>
+            <a:picLocks noChangeAspect="1"/>
+          </p:cNvPicPr>
+          <p:nvPr/>
+        </p:nvPicPr>
+        <p:blipFill>
+          <a:blip r:embed="rId2"/>
+          <a:stretch>
+            <a:fillRect/>
+          </a:stretch>
+        </p:blipFill>
+        <p:spPr>
+          <a:xfrm>
+            <a:off x="1555749" y="2808580"/>
+            <a:ext cx="5330135" cy="2592549"/>
+          </a:xfrm>
+          <a:prstGeom prst="rect">
+            <a:avLst/>
+          </a:prstGeom>
+        </p:spPr>
+      </p:pic>
+      <p:sp>
+        <p:nvSpPr>
+          <p:cNvPr id="3" name="TextBox 2">
+            <a:extLst>
+              <a:ext uri="{FF2B5EF4-FFF2-40B4-BE49-F238E27FC236}">
+                <a16:creationId xmlns:a16="http://schemas.microsoft.com/office/drawing/2014/main" id="{7BEEB92E-FEA8-9446-AA96-9AC3AE2E5DD1}"/>
+              </a:ext>
+            </a:extLst>
+          </p:cNvPr>
+          <p:cNvSpPr txBox="1"/>
+          <p:nvPr/>
+        </p:nvSpPr>
+        <p:spPr>
+          <a:xfrm>
+            <a:off x="2949978" y="1737886"/>
+            <a:ext cx="6292043" cy="369332"/>
+          </a:xfrm>
+          <a:prstGeom prst="rect">
+            <a:avLst/>
+          </a:prstGeom>
+          <a:noFill/>
+        </p:spPr>
+        <p:txBody>
+          <a:bodyPr wrap="none" rtlCol="0">
+            <a:spAutoFit/>
+          </a:bodyPr>
+          <a:lstStyle/>
+          <a:p>
+            <a:r>
+              <a:rPr lang="en-US" b="1" dirty="0"/>
+              <a:t>Mean, Variance and Ranking of each uncertain parameter group</a:t>
+            </a:r>
+          </a:p>
+        </p:txBody>
+      </p:sp>
+      <p:pic>
+        <p:nvPicPr>
+          <p:cNvPr id="4" name="Picture 3">
+            <a:extLst>
+              <a:ext uri="{FF2B5EF4-FFF2-40B4-BE49-F238E27FC236}">
+                <a16:creationId xmlns:a16="http://schemas.microsoft.com/office/drawing/2014/main" id="{D17CBBB1-5770-534B-9FD3-E3F0CB872D01}"/>
+              </a:ext>
+            </a:extLst>
+          </p:cNvPr>
+          <p:cNvPicPr>
+            <a:picLocks noChangeAspect="1"/>
+          </p:cNvPicPr>
+          <p:nvPr/>
+        </p:nvPicPr>
+        <p:blipFill>
+          <a:blip r:embed="rId3"/>
+          <a:stretch>
+            <a:fillRect/>
+          </a:stretch>
+        </p:blipFill>
+        <p:spPr>
+          <a:xfrm>
+            <a:off x="6885884" y="2508251"/>
+            <a:ext cx="3955254" cy="2926080"/>
+          </a:xfrm>
+          <a:prstGeom prst="rect">
+            <a:avLst/>
+          </a:prstGeom>
+        </p:spPr>
+      </p:pic>
+    </p:spTree>
+    <p:extLst>
+      <p:ext uri="{BB962C8B-B14F-4D97-AF65-F5344CB8AC3E}">
+        <p14:creationId xmlns:p14="http://schemas.microsoft.com/office/powerpoint/2010/main" val="3968913872"/>
+      </p:ext>
+    </p:extLst>
+  </p:cSld>
+  <p:clrMapOvr>
+    <a:masterClrMapping/>
+  </p:clrMapOvr>
+</p:sld>
+</file>
+
+<file path=ppt/slides/slide2.xml><?xml version="1.0" encoding="utf-8"?>
+<p:sld xmlns:a="http://schemas.openxmlformats.org/drawingml/2006/main" xmlns:r="http://schemas.openxmlformats.org/officeDocument/2006/relationships" xmlns:p="http://schemas.openxmlformats.org/presentationml/2006/main">
+  <p:cSld>
+    <p:bg>
+      <p:bgPr>
+        <a:solidFill>
+          <a:schemeClr val="bg1"/>
+        </a:solidFill>
+        <a:effectLst/>
+      </p:bgPr>
+    </p:bg>
+    <p:spTree>
+      <p:nvGrpSpPr>
+        <p:cNvPr id="1" name=""/>
+        <p:cNvGrpSpPr/>
+        <p:nvPr/>
+      </p:nvGrpSpPr>
+      <p:grpSpPr>
+        <a:xfrm>
+          <a:off x="0" y="0"/>
+          <a:ext cx="0" cy="0"/>
+          <a:chOff x="0" y="0"/>
+          <a:chExt cx="0" cy="0"/>
+        </a:xfrm>
+      </p:grpSpPr>
+      <p:sp useBgFill="1">
+        <p:nvSpPr>
+          <p:cNvPr id="8" name="Rectangle 7">
+            <a:extLst>
+              <a:ext uri="{FF2B5EF4-FFF2-40B4-BE49-F238E27FC236}">
+                <a16:creationId xmlns:a16="http://schemas.microsoft.com/office/drawing/2014/main" id="{FFD48BC7-DC40-47DE-87EE-9F4B6ECB9ABB}"/>
+              </a:ext>
+              <a:ext uri="{C183D7F6-B498-43B3-948B-1728B52AA6E4}">
+                <adec:decorative xmlns:adec="http://schemas.microsoft.com/office/drawing/2017/decorative" val="1"/>
+              </a:ext>
+            </a:extLst>
+          </p:cNvPr>
+          <p:cNvSpPr>
+            <a:spLocks noGrp="1" noRot="1" noChangeAspect="1" noMove="1" noResize="1" noEditPoints="1" noAdjustHandles="1" noChangeArrowheads="1" noChangeShapeType="1" noTextEdit="1"/>
+          </p:cNvSpPr>
+          <p:nvPr>
+            <p:extLst>
+              <p:ext uri="{386F3935-93C4-4BCD-93E2-E3B085C9AB24}">
+                <p16:designElem xmlns:p16="http://schemas.microsoft.com/office/powerpoint/2015/main" val="1"/>
+              </p:ext>
+            </p:extLst>
+          </p:nvPr>
+        </p:nvSpPr>
+        <p:spPr>
+          <a:xfrm>
+            <a:off x="0" y="0"/>
+            <a:ext cx="12192000" cy="6858000"/>
+          </a:xfrm>
+          <a:prstGeom prst="rect">
+            <a:avLst/>
+          </a:prstGeom>
+          <a:ln>
+            <a:noFill/>
+          </a:ln>
+        </p:spPr>
+        <p:style>
+          <a:lnRef idx="2">
+            <a:schemeClr val="accent1">
+              <a:shade val="50000"/>
+            </a:schemeClr>
+          </a:lnRef>
+          <a:fillRef idx="1">
+            <a:schemeClr val="accent1"/>
+          </a:fillRef>
+          <a:effectRef idx="0">
+            <a:schemeClr val="accent1"/>
+          </a:effectRef>
+          <a:fontRef idx="minor">
+            <a:schemeClr val="lt1"/>
+          </a:fontRef>
+        </p:style>
+        <p:txBody>
+          <a:bodyPr rtlCol="0" anchor="ctr"/>
+          <a:lstStyle/>
+          <a:p>
+            <a:pPr algn="ctr"/>
+            <a:endParaRPr lang="en-US"/>
+          </a:p>
+        </p:txBody>
+      </p:sp>
+      <p:sp useBgFill="1">
+        <p:nvSpPr>
+          <p:cNvPr id="10" name="Freeform: Shape 9">
+            <a:extLst>
+              <a:ext uri="{FF2B5EF4-FFF2-40B4-BE49-F238E27FC236}">
+                <a16:creationId xmlns:a16="http://schemas.microsoft.com/office/drawing/2014/main" id="{E502BBC7-2C76-46F3-BC24-5985BC13DB88}"/>
+              </a:ext>
+              <a:ext uri="{C183D7F6-B498-43B3-948B-1728B52AA6E4}">
+                <adec:decorative xmlns:adec="http://schemas.microsoft.com/office/drawing/2017/decorative" val="1"/>
+              </a:ext>
+            </a:extLst>
+          </p:cNvPr>
+          <p:cNvSpPr>
+            <a:spLocks noGrp="1" noRot="1" noChangeAspect="1" noMove="1" noResize="1" noEditPoints="1" noAdjustHandles="1" noChangeArrowheads="1" noChangeShapeType="1" noTextEdit="1"/>
+          </p:cNvSpPr>
+          <p:nvPr>
+            <p:extLst>
+              <p:ext uri="{386F3935-93C4-4BCD-93E2-E3B085C9AB24}">
+                <p16:designElem xmlns:p16="http://schemas.microsoft.com/office/powerpoint/2015/main" val="1"/>
+              </p:ext>
+            </p:extLst>
+          </p:nvPr>
+        </p:nvSpPr>
+        <p:spPr>
+          <a:xfrm>
+            <a:off x="1114425" y="0"/>
+            <a:ext cx="9963150" cy="6858000"/>
+          </a:xfrm>
+          <a:custGeom>
+            <a:avLst/>
+            <a:gdLst>
+              <a:gd name="connsiteX0" fmla="*/ 1595771 w 9963150"/>
+              <a:gd name="connsiteY0" fmla="*/ 0 h 6858000"/>
+              <a:gd name="connsiteX1" fmla="*/ 8367379 w 9963150"/>
+              <a:gd name="connsiteY1" fmla="*/ 0 h 6858000"/>
+              <a:gd name="connsiteX2" fmla="*/ 8504080 w 9963150"/>
+              <a:gd name="connsiteY2" fmla="*/ 130333 h 6858000"/>
+              <a:gd name="connsiteX3" fmla="*/ 9963150 w 9963150"/>
+              <a:gd name="connsiteY3" fmla="*/ 3652838 h 6858000"/>
+              <a:gd name="connsiteX4" fmla="*/ 8825600 w 9963150"/>
+              <a:gd name="connsiteY4" fmla="*/ 6821583 h 6858000"/>
+              <a:gd name="connsiteX5" fmla="*/ 8794055 w 9963150"/>
+              <a:gd name="connsiteY5" fmla="*/ 6858000 h 6858000"/>
+              <a:gd name="connsiteX6" fmla="*/ 1169096 w 9963150"/>
+              <a:gd name="connsiteY6" fmla="*/ 6858000 h 6858000"/>
+              <a:gd name="connsiteX7" fmla="*/ 1137550 w 9963150"/>
+              <a:gd name="connsiteY7" fmla="*/ 6821583 h 6858000"/>
+              <a:gd name="connsiteX8" fmla="*/ 0 w 9963150"/>
+              <a:gd name="connsiteY8" fmla="*/ 3652838 h 6858000"/>
+              <a:gd name="connsiteX9" fmla="*/ 1459070 w 9963150"/>
+              <a:gd name="connsiteY9" fmla="*/ 130333 h 6858000"/>
+            </a:gdLst>
+            <a:ahLst/>
+            <a:cxnLst>
+              <a:cxn ang="0">
+                <a:pos x="connsiteX0" y="connsiteY0"/>
+              </a:cxn>
+              <a:cxn ang="0">
+                <a:pos x="connsiteX1" y="connsiteY1"/>
+              </a:cxn>
+              <a:cxn ang="0">
+                <a:pos x="connsiteX2" y="connsiteY2"/>
+              </a:cxn>
+              <a:cxn ang="0">
+                <a:pos x="connsiteX3" y="connsiteY3"/>
+              </a:cxn>
+              <a:cxn ang="0">
+                <a:pos x="connsiteX4" y="connsiteY4"/>
+              </a:cxn>
+              <a:cxn ang="0">
+                <a:pos x="connsiteX5" y="connsiteY5"/>
+              </a:cxn>
+              <a:cxn ang="0">
+                <a:pos x="connsiteX6" y="connsiteY6"/>
+              </a:cxn>
+              <a:cxn ang="0">
+                <a:pos x="connsiteX7" y="connsiteY7"/>
+              </a:cxn>
+              <a:cxn ang="0">
+                <a:pos x="connsiteX8" y="connsiteY8"/>
+              </a:cxn>
+              <a:cxn ang="0">
+                <a:pos x="connsiteX9" y="connsiteY9"/>
+              </a:cxn>
+            </a:cxnLst>
+            <a:rect l="l" t="t" r="r" b="b"/>
+            <a:pathLst>
+              <a:path w="9963150" h="6858000">
+                <a:moveTo>
+                  <a:pt x="1595771" y="0"/>
+                </a:moveTo>
+                <a:lnTo>
+                  <a:pt x="8367379" y="0"/>
+                </a:lnTo>
+                <a:lnTo>
+                  <a:pt x="8504080" y="130333"/>
+                </a:lnTo>
+                <a:cubicBezTo>
+                  <a:pt x="9405568" y="1031820"/>
+                  <a:pt x="9963150" y="2277214"/>
+                  <a:pt x="9963150" y="3652838"/>
+                </a:cubicBezTo>
+                <a:cubicBezTo>
+                  <a:pt x="9963150" y="4856509"/>
+                  <a:pt x="9536251" y="5960473"/>
+                  <a:pt x="8825600" y="6821583"/>
+                </a:cubicBezTo>
+                <a:lnTo>
+                  <a:pt x="8794055" y="6858000"/>
+                </a:lnTo>
+                <a:lnTo>
+                  <a:pt x="1169096" y="6858000"/>
+                </a:lnTo>
+                <a:lnTo>
+                  <a:pt x="1137550" y="6821583"/>
+                </a:lnTo>
+                <a:cubicBezTo>
+                  <a:pt x="426899" y="5960473"/>
+                  <a:pt x="0" y="4856509"/>
+                  <a:pt x="0" y="3652838"/>
+                </a:cubicBezTo>
+                <a:cubicBezTo>
+                  <a:pt x="0" y="2277214"/>
+                  <a:pt x="557582" y="1031820"/>
+                  <a:pt x="1459070" y="130333"/>
+                </a:cubicBezTo>
+                <a:close/>
+              </a:path>
+            </a:pathLst>
+          </a:custGeom>
+          <a:ln w="9525">
+            <a:solidFill>
+              <a:srgbClr val="EFEFEF"/>
+            </a:solidFill>
+          </a:ln>
+          <a:effectLst>
+            <a:outerShdw blurRad="139700" sx="102000" sy="102000" algn="ctr" rotWithShape="0">
+              <a:schemeClr val="bg1">
+                <a:lumMod val="85000"/>
+                <a:alpha val="38000"/>
+              </a:schemeClr>
+            </a:outerShdw>
+          </a:effectLst>
+        </p:spPr>
+        <p:style>
+          <a:lnRef idx="2">
+            <a:schemeClr val="accent1">
+              <a:shade val="50000"/>
+            </a:schemeClr>
+          </a:lnRef>
+          <a:fillRef idx="1">
+            <a:schemeClr val="accent1"/>
+          </a:fillRef>
+          <a:effectRef idx="0">
+            <a:schemeClr val="accent1"/>
+          </a:effectRef>
+          <a:fontRef idx="minor">
+            <a:schemeClr val="lt1"/>
+          </a:fontRef>
+        </p:style>
+        <p:txBody>
+          <a:bodyPr wrap="square" rtlCol="0" anchor="ctr">
+            <a:noAutofit/>
+          </a:bodyPr>
+          <a:lstStyle/>
+          <a:p>
+            <a:pPr marL="0" marR="0" lvl="0" indent="0" algn="ctr" defTabSz="914400" rtl="0" eaLnBrk="1" fontAlgn="auto" latinLnBrk="0" hangingPunct="1">
+              <a:lnSpc>
+                <a:spcPct val="100000"/>
+              </a:lnSpc>
+              <a:spcBef>
+                <a:spcPts val="0"/>
+              </a:spcBef>
+              <a:spcAft>
+                <a:spcPts val="0"/>
+              </a:spcAft>
+              <a:buClrTx/>
+              <a:buSzTx/>
+              <a:buFontTx/>
+              <a:buNone/>
+              <a:tabLst/>
+              <a:defRPr/>
+            </a:pPr>
+            <a:endParaRPr kumimoji="0" lang="en-US" sz="1800" b="0" i="0" u="none" strike="noStrike" kern="1200" cap="none" spc="0" normalizeH="0" baseline="0" noProof="0">
+              <a:ln>
+                <a:noFill/>
+              </a:ln>
+              <a:solidFill>
+                <a:prstClr val="white"/>
+              </a:solidFill>
+              <a:effectLst/>
+              <a:uLnTx/>
+              <a:uFillTx/>
+              <a:latin typeface="Calibri" panose="020F0502020204030204"/>
+              <a:ea typeface="+mn-ea"/>
+              <a:cs typeface="+mn-cs"/>
+            </a:endParaRPr>
+          </a:p>
+        </p:txBody>
+      </p:sp>
+      <p:sp useBgFill="1">
+        <p:nvSpPr>
+          <p:cNvPr id="12" name="Freeform: Shape 11">
+            <a:extLst>
+              <a:ext uri="{FF2B5EF4-FFF2-40B4-BE49-F238E27FC236}">
+                <a16:creationId xmlns:a16="http://schemas.microsoft.com/office/drawing/2014/main" id="{C7F28D52-2A5F-4D23-81AE-7CB8B591C7AF}"/>
+              </a:ext>
+              <a:ext uri="{C183D7F6-B498-43B3-948B-1728B52AA6E4}">
+                <adec:decorative xmlns:adec="http://schemas.microsoft.com/office/drawing/2017/decorative" val="1"/>
+              </a:ext>
+            </a:extLst>
+          </p:cNvPr>
+          <p:cNvSpPr>
+            <a:spLocks noGrp="1" noRot="1" noChangeAspect="1" noMove="1" noResize="1" noEditPoints="1" noAdjustHandles="1" noChangeArrowheads="1" noChangeShapeType="1" noTextEdit="1"/>
+          </p:cNvSpPr>
+          <p:nvPr>
+            <p:extLst>
+              <p:ext uri="{386F3935-93C4-4BCD-93E2-E3B085C9AB24}">
+                <p16:designElem xmlns:p16="http://schemas.microsoft.com/office/powerpoint/2015/main" val="1"/>
+              </p:ext>
+            </p:extLst>
+          </p:nvPr>
+        </p:nvSpPr>
+        <p:spPr>
+          <a:xfrm>
+            <a:off x="1121664" y="0"/>
+            <a:ext cx="9948672" cy="6858000"/>
+          </a:xfrm>
+          <a:custGeom>
+            <a:avLst/>
+            <a:gdLst>
+              <a:gd name="connsiteX0" fmla="*/ 1595771 w 9963150"/>
+              <a:gd name="connsiteY0" fmla="*/ 0 h 6858000"/>
+              <a:gd name="connsiteX1" fmla="*/ 8367379 w 9963150"/>
+              <a:gd name="connsiteY1" fmla="*/ 0 h 6858000"/>
+              <a:gd name="connsiteX2" fmla="*/ 8504080 w 9963150"/>
+              <a:gd name="connsiteY2" fmla="*/ 130333 h 6858000"/>
+              <a:gd name="connsiteX3" fmla="*/ 9963150 w 9963150"/>
+              <a:gd name="connsiteY3" fmla="*/ 3652838 h 6858000"/>
+              <a:gd name="connsiteX4" fmla="*/ 8825600 w 9963150"/>
+              <a:gd name="connsiteY4" fmla="*/ 6821583 h 6858000"/>
+              <a:gd name="connsiteX5" fmla="*/ 8794055 w 9963150"/>
+              <a:gd name="connsiteY5" fmla="*/ 6858000 h 6858000"/>
+              <a:gd name="connsiteX6" fmla="*/ 1169096 w 9963150"/>
+              <a:gd name="connsiteY6" fmla="*/ 6858000 h 6858000"/>
+              <a:gd name="connsiteX7" fmla="*/ 1137550 w 9963150"/>
+              <a:gd name="connsiteY7" fmla="*/ 6821583 h 6858000"/>
+              <a:gd name="connsiteX8" fmla="*/ 0 w 9963150"/>
+              <a:gd name="connsiteY8" fmla="*/ 3652838 h 6858000"/>
+              <a:gd name="connsiteX9" fmla="*/ 1459070 w 9963150"/>
+              <a:gd name="connsiteY9" fmla="*/ 130333 h 6858000"/>
+            </a:gdLst>
+            <a:ahLst/>
+            <a:cxnLst>
+              <a:cxn ang="0">
+                <a:pos x="connsiteX0" y="connsiteY0"/>
+              </a:cxn>
+              <a:cxn ang="0">
+                <a:pos x="connsiteX1" y="connsiteY1"/>
+              </a:cxn>
+              <a:cxn ang="0">
+                <a:pos x="connsiteX2" y="connsiteY2"/>
+              </a:cxn>
+              <a:cxn ang="0">
+                <a:pos x="connsiteX3" y="connsiteY3"/>
+              </a:cxn>
+              <a:cxn ang="0">
+                <a:pos x="connsiteX4" y="connsiteY4"/>
+              </a:cxn>
+              <a:cxn ang="0">
+                <a:pos x="connsiteX5" y="connsiteY5"/>
+              </a:cxn>
+              <a:cxn ang="0">
+                <a:pos x="connsiteX6" y="connsiteY6"/>
+              </a:cxn>
+              <a:cxn ang="0">
+                <a:pos x="connsiteX7" y="connsiteY7"/>
+              </a:cxn>
+              <a:cxn ang="0">
+                <a:pos x="connsiteX8" y="connsiteY8"/>
+              </a:cxn>
+              <a:cxn ang="0">
+                <a:pos x="connsiteX9" y="connsiteY9"/>
+              </a:cxn>
+            </a:cxnLst>
+            <a:rect l="l" t="t" r="r" b="b"/>
+            <a:pathLst>
+              <a:path w="9963150" h="6858000">
+                <a:moveTo>
+                  <a:pt x="1595771" y="0"/>
+                </a:moveTo>
+                <a:lnTo>
+                  <a:pt x="8367379" y="0"/>
+                </a:lnTo>
+                <a:lnTo>
+                  <a:pt x="8504080" y="130333"/>
+                </a:lnTo>
+                <a:cubicBezTo>
+                  <a:pt x="9405568" y="1031820"/>
+                  <a:pt x="9963150" y="2277214"/>
+                  <a:pt x="9963150" y="3652838"/>
+                </a:cubicBezTo>
+                <a:cubicBezTo>
+                  <a:pt x="9963150" y="4856509"/>
+                  <a:pt x="9536251" y="5960473"/>
+                  <a:pt x="8825600" y="6821583"/>
+                </a:cubicBezTo>
+                <a:lnTo>
+                  <a:pt x="8794055" y="6858000"/>
+                </a:lnTo>
+                <a:lnTo>
+                  <a:pt x="1169096" y="6858000"/>
+                </a:lnTo>
+                <a:lnTo>
+                  <a:pt x="1137550" y="6821583"/>
+                </a:lnTo>
+                <a:cubicBezTo>
+                  <a:pt x="426899" y="5960473"/>
+                  <a:pt x="0" y="4856509"/>
+                  <a:pt x="0" y="3652838"/>
+                </a:cubicBezTo>
+                <a:cubicBezTo>
+                  <a:pt x="0" y="2277214"/>
+                  <a:pt x="557582" y="1031820"/>
+                  <a:pt x="1459070" y="130333"/>
+                </a:cubicBezTo>
+                <a:close/>
+              </a:path>
+            </a:pathLst>
+          </a:custGeom>
+          <a:ln w="9525">
+            <a:noFill/>
+          </a:ln>
+          <a:effectLst/>
+        </p:spPr>
+        <p:style>
+          <a:lnRef idx="2">
+            <a:schemeClr val="accent1">
+              <a:shade val="50000"/>
+            </a:schemeClr>
+          </a:lnRef>
+          <a:fillRef idx="1">
+            <a:schemeClr val="accent1"/>
+          </a:fillRef>
+          <a:effectRef idx="0">
+            <a:schemeClr val="accent1"/>
+          </a:effectRef>
+          <a:fontRef idx="minor">
+            <a:schemeClr val="lt1"/>
+          </a:fontRef>
+        </p:style>
+        <p:txBody>
+          <a:bodyPr wrap="square" rtlCol="0" anchor="ctr">
+            <a:noAutofit/>
+          </a:bodyPr>
+          <a:lstStyle/>
+          <a:p>
+            <a:pPr marL="0" marR="0" lvl="0" indent="0" algn="ctr" defTabSz="914400" rtl="0" eaLnBrk="1" fontAlgn="auto" latinLnBrk="0" hangingPunct="1">
+              <a:lnSpc>
+                <a:spcPct val="100000"/>
+              </a:lnSpc>
+              <a:spcBef>
+                <a:spcPts val="0"/>
+              </a:spcBef>
+              <a:spcAft>
+                <a:spcPts val="0"/>
+              </a:spcAft>
+              <a:buClrTx/>
+              <a:buSzTx/>
+              <a:buFontTx/>
+              <a:buNone/>
+              <a:tabLst/>
+              <a:defRPr/>
+            </a:pPr>
+            <a:endParaRPr kumimoji="0" lang="en-US" sz="1800" b="0" i="0" u="none" strike="noStrike" kern="1200" cap="none" spc="0" normalizeH="0" baseline="0" noProof="0">
+              <a:ln>
+                <a:noFill/>
+              </a:ln>
+              <a:solidFill>
+                <a:prstClr val="white"/>
+              </a:solidFill>
+              <a:effectLst/>
+              <a:uLnTx/>
+              <a:uFillTx/>
+              <a:latin typeface="Calibri" panose="020F0502020204030204"/>
+              <a:ea typeface="+mn-ea"/>
+              <a:cs typeface="+mn-cs"/>
+            </a:endParaRPr>
+          </a:p>
+        </p:txBody>
+      </p:sp>
+      <p:sp>
+        <p:nvSpPr>
+          <p:cNvPr id="2" name="Title 1">
+            <a:extLst>
+              <a:ext uri="{FF2B5EF4-FFF2-40B4-BE49-F238E27FC236}">
+                <a16:creationId xmlns:a16="http://schemas.microsoft.com/office/drawing/2014/main" id="{6FEE9870-82B6-5744-B0E8-3C959D92333D}"/>
+              </a:ext>
+            </a:extLst>
+          </p:cNvPr>
+          <p:cNvSpPr>
+            <a:spLocks noGrp="1"/>
+          </p:cNvSpPr>
+          <p:nvPr>
+            <p:ph type="title"/>
+          </p:nvPr>
+        </p:nvSpPr>
+        <p:spPr>
+          <a:xfrm>
+            <a:off x="1524003" y="1999615"/>
+            <a:ext cx="9144000" cy="2764028"/>
+          </a:xfrm>
+        </p:spPr>
+        <p:txBody>
+          <a:bodyPr vert="horz" lIns="91440" tIns="45720" rIns="91440" bIns="45720" rtlCol="0" anchor="ctr">
+            <a:normAutofit/>
+          </a:bodyPr>
+          <a:lstStyle/>
+          <a:p>
+            <a:pPr algn="ctr"/>
+            <a:r>
+              <a:rPr lang="en-US" sz="7200" kern="1200">
+                <a:solidFill>
+                  <a:schemeClr val="tx1"/>
+                </a:solidFill>
+                <a:latin typeface="+mj-lt"/>
+                <a:ea typeface="+mj-ea"/>
+                <a:cs typeface="+mj-cs"/>
+              </a:rPr>
               <a:t>Concept</a:t>
             </a:r>
           </a:p>
@@ -6768,12 +8025,119 @@
             <p:ph type="body" idx="1"/>
           </p:nvPr>
         </p:nvSpPr>
-        <p:spPr/>
+        <p:spPr>
+          <a:xfrm>
+            <a:off x="1966912" y="5645150"/>
+            <a:ext cx="8258176" cy="631825"/>
+          </a:xfrm>
+        </p:spPr>
         <p:txBody>
-          <a:bodyPr/>
+          <a:bodyPr vert="horz" lIns="91440" tIns="45720" rIns="91440" bIns="45720" rtlCol="0" anchor="ctr">
+            <a:normAutofit/>
+          </a:bodyPr>
           <a:lstStyle/>
           <a:p>
-            <a:endParaRPr lang="en-US"/>
+            <a:pPr algn="ctr"/>
+            <a:endParaRPr lang="en-US" sz="2800" kern="1200">
+              <a:solidFill>
+                <a:schemeClr val="tx1"/>
+              </a:solidFill>
+              <a:latin typeface="+mn-lt"/>
+              <a:ea typeface="+mn-ea"/>
+              <a:cs typeface="+mn-cs"/>
+            </a:endParaRPr>
+          </a:p>
+        </p:txBody>
+      </p:sp>
+      <p:sp>
+        <p:nvSpPr>
+          <p:cNvPr id="14" name="Rectangle 13">
+            <a:extLst>
+              <a:ext uri="{FF2B5EF4-FFF2-40B4-BE49-F238E27FC236}">
+                <a16:creationId xmlns:a16="http://schemas.microsoft.com/office/drawing/2014/main" id="{3629484E-3792-4B3D-89AD-7C8A1ED0E0D4}"/>
+              </a:ext>
+              <a:ext uri="{C183D7F6-B498-43B3-948B-1728B52AA6E4}">
+                <adec:decorative xmlns:adec="http://schemas.microsoft.com/office/drawing/2017/decorative" val="1"/>
+              </a:ext>
+            </a:extLst>
+          </p:cNvPr>
+          <p:cNvSpPr>
+            <a:spLocks noGrp="1" noRot="1" noChangeAspect="1" noMove="1" noResize="1" noEditPoints="1" noAdjustHandles="1" noChangeArrowheads="1" noChangeShapeType="1" noTextEdit="1"/>
+          </p:cNvSpPr>
+          <p:nvPr>
+            <p:extLst>
+              <p:ext uri="{386F3935-93C4-4BCD-93E2-E3B085C9AB24}">
+                <p16:designElem xmlns:p16="http://schemas.microsoft.com/office/powerpoint/2015/main" val="1"/>
+              </p:ext>
+            </p:extLst>
+          </p:nvPr>
+        </p:nvSpPr>
+        <p:spPr>
+          <a:xfrm>
+            <a:off x="3718560" y="5524786"/>
+            <a:ext cx="4754880" cy="27432"/>
+          </a:xfrm>
+          <a:prstGeom prst="rect">
+            <a:avLst/>
+          </a:prstGeom>
+          <a:solidFill>
+            <a:schemeClr val="accent2"/>
+          </a:solidFill>
+          <a:ln>
+            <a:noFill/>
+          </a:ln>
+        </p:spPr>
+        <p:style>
+          <a:lnRef idx="2">
+            <a:schemeClr val="accent1">
+              <a:shade val="50000"/>
+            </a:schemeClr>
+          </a:lnRef>
+          <a:fillRef idx="1">
+            <a:schemeClr val="accent1"/>
+          </a:fillRef>
+          <a:effectRef idx="0">
+            <a:schemeClr val="accent1"/>
+          </a:effectRef>
+          <a:fontRef idx="minor">
+            <a:schemeClr val="lt1"/>
+          </a:fontRef>
+        </p:style>
+        <p:txBody>
+          <a:bodyPr rtlCol="0" anchor="ctr"/>
+          <a:lstStyle/>
+          <a:p>
+            <a:pPr marL="0" marR="0" lvl="0" indent="0" algn="ctr" defTabSz="914400" rtl="0" eaLnBrk="1" fontAlgn="auto" latinLnBrk="0" hangingPunct="1">
+              <a:lnSpc>
+                <a:spcPct val="100000"/>
+              </a:lnSpc>
+              <a:spcBef>
+                <a:spcPts val="0"/>
+              </a:spcBef>
+              <a:spcAft>
+                <a:spcPts val="0"/>
+              </a:spcAft>
+              <a:buClrTx/>
+              <a:buSzTx/>
+              <a:buFontTx/>
+              <a:buNone/>
+              <a:tabLst/>
+              <a:defRPr/>
+            </a:pPr>
+            <a:endParaRPr kumimoji="0" lang="en-US" sz="1800" b="0" i="0" u="none" strike="noStrike" kern="1200" cap="none" spc="0" normalizeH="0" baseline="0" noProof="0">
+              <a:ln>
+                <a:noFill/>
+              </a:ln>
+              <a:solidFill>
+                <a:prstClr val="white"/>
+              </a:solidFill>
+              <a:effectLst/>
+              <a:uLnTx/>
+              <a:uFillTx/>
+              <a:latin typeface="Calibri" panose="020F0502020204030204"/>
+              <a:ea typeface="+mn-ea"/>
+              <a:cs typeface="+mn-cs"/>
+            </a:endParaRPr>
           </a:p>
         </p:txBody>
       </p:sp>
@@ -6807,8 +8171,8 @@
           <a:chExt cx="0" cy="0"/>
         </a:xfrm>
       </p:grpSpPr>
-      <mc:AlternateContent xmlns:mc="http://schemas.openxmlformats.org/markup-compatibility/2006">
-        <mc:Choice xmlns:a14="http://schemas.microsoft.com/office/drawing/2010/main" Requires="a14">
+      <mc:AlternateContent xmlns:mc="http://schemas.openxmlformats.org/markup-compatibility/2006" xmlns:a14="http://schemas.microsoft.com/office/drawing/2010/main">
+        <mc:Choice Requires="a14">
           <p:sp>
             <p:nvSpPr>
               <p:cNvPr id="13" name="TextBox 12">
@@ -7125,7 +8489,7 @@
             </p:txBody>
           </p:sp>
         </mc:Choice>
-        <mc:Fallback>
+        <mc:Fallback xmlns="">
           <p:sp>
             <p:nvSpPr>
               <p:cNvPr id="13" name="TextBox 12">
@@ -8476,8 +9840,8 @@
           </a:graphicData>
         </a:graphic>
       </p:graphicFrame>
-      <mc:AlternateContent xmlns:mc="http://schemas.openxmlformats.org/markup-compatibility/2006">
-        <mc:Choice xmlns:a14="http://schemas.microsoft.com/office/drawing/2010/main" Requires="a14">
+      <mc:AlternateContent xmlns:mc="http://schemas.openxmlformats.org/markup-compatibility/2006" xmlns:a14="http://schemas.microsoft.com/office/drawing/2010/main">
+        <mc:Choice Requires="a14">
           <p:sp>
             <p:nvSpPr>
               <p:cNvPr id="3" name="TextBox 2">
@@ -8506,6 +9870,7 @@
               </a:bodyPr>
               <a:lstStyle/>
               <a:p>
+                <a:pPr/>
                 <a14:m>
                   <m:oMathPara xmlns:m="http://schemas.openxmlformats.org/officeDocument/2006/math">
                     <m:oMathParaPr>
@@ -8545,7 +9910,7 @@
             </p:txBody>
           </p:sp>
         </mc:Choice>
-        <mc:Fallback>
+        <mc:Fallback xmlns="">
           <p:sp>
             <p:nvSpPr>
               <p:cNvPr id="3" name="TextBox 2">
@@ -8590,8 +9955,8 @@
           </p:sp>
         </mc:Fallback>
       </mc:AlternateContent>
-      <mc:AlternateContent xmlns:mc="http://schemas.openxmlformats.org/markup-compatibility/2006">
-        <mc:Choice xmlns:a14="http://schemas.microsoft.com/office/drawing/2010/main" Requires="a14">
+      <mc:AlternateContent xmlns:mc="http://schemas.openxmlformats.org/markup-compatibility/2006" xmlns:a14="http://schemas.microsoft.com/office/drawing/2010/main">
+        <mc:Choice Requires="a14">
           <p:sp>
             <p:nvSpPr>
               <p:cNvPr id="4" name="TextBox 3">
@@ -8620,6 +9985,7 @@
               </a:bodyPr>
               <a:lstStyle/>
               <a:p>
+                <a:pPr/>
                 <a14:m>
                   <m:oMathPara xmlns:m="http://schemas.openxmlformats.org/officeDocument/2006/math">
                     <m:oMathParaPr>
@@ -8659,7 +10025,7 @@
             </p:txBody>
           </p:sp>
         </mc:Choice>
-        <mc:Fallback>
+        <mc:Fallback xmlns="">
           <p:sp>
             <p:nvSpPr>
               <p:cNvPr id="4" name="TextBox 3">
@@ -9568,8 +10934,8 @@
           <a:chExt cx="0" cy="0"/>
         </a:xfrm>
       </p:grpSpPr>
-      <mc:AlternateContent xmlns:mc="http://schemas.openxmlformats.org/markup-compatibility/2006">
-        <mc:Choice xmlns:a14="http://schemas.microsoft.com/office/drawing/2010/main" Requires="a14">
+      <mc:AlternateContent xmlns:mc="http://schemas.openxmlformats.org/markup-compatibility/2006" xmlns:a14="http://schemas.microsoft.com/office/drawing/2010/main">
+        <mc:Choice Requires="a14">
           <p:graphicFrame>
             <p:nvGraphicFramePr>
               <p:cNvPr id="28" name="Table 28">
@@ -12687,7 +14053,7 @@
             </a:graphic>
           </p:graphicFrame>
         </mc:Choice>
-        <mc:Fallback>
+        <mc:Fallback xmlns="">
           <p:graphicFrame>
             <p:nvGraphicFramePr>
               <p:cNvPr id="28" name="Table 28">
@@ -15743,8 +17109,8 @@
           </a:p>
         </p:txBody>
       </p:sp>
-      <mc:AlternateContent xmlns:mc="http://schemas.openxmlformats.org/markup-compatibility/2006">
-        <mc:Choice xmlns:a14="http://schemas.microsoft.com/office/drawing/2010/main" Requires="a14">
+      <mc:AlternateContent xmlns:mc="http://schemas.openxmlformats.org/markup-compatibility/2006" xmlns:a14="http://schemas.microsoft.com/office/drawing/2010/main">
+        <mc:Choice Requires="a14">
           <p:sp>
             <p:nvSpPr>
               <p:cNvPr id="31" name="TextBox 30">
@@ -16171,7 +17537,7 @@
             </p:txBody>
           </p:sp>
         </mc:Choice>
-        <mc:Fallback>
+        <mc:Fallback xmlns="">
           <p:sp>
             <p:nvSpPr>
               <p:cNvPr id="31" name="TextBox 30">
@@ -16271,8 +17637,8 @@
           </a:p>
         </p:txBody>
       </p:sp>
-      <mc:AlternateContent xmlns:mc="http://schemas.openxmlformats.org/markup-compatibility/2006">
-        <mc:Choice xmlns:a14="http://schemas.microsoft.com/office/drawing/2010/main" Requires="a14">
+      <mc:AlternateContent xmlns:mc="http://schemas.openxmlformats.org/markup-compatibility/2006" xmlns:a14="http://schemas.microsoft.com/office/drawing/2010/main">
+        <mc:Choice Requires="a14">
           <p:graphicFrame>
             <p:nvGraphicFramePr>
               <p:cNvPr id="33" name="Table 28">
@@ -19354,7 +20720,7 @@
             </a:graphic>
           </p:graphicFrame>
         </mc:Choice>
-        <mc:Fallback>
+        <mc:Fallback xmlns="">
           <p:graphicFrame>
             <p:nvGraphicFramePr>
               <p:cNvPr id="33" name="Table 28">
@@ -22486,8 +23852,8 @@
           </a:p>
         </p:txBody>
       </p:sp>
-      <mc:AlternateContent xmlns:mc="http://schemas.openxmlformats.org/markup-compatibility/2006">
-        <mc:Choice xmlns:a14="http://schemas.microsoft.com/office/drawing/2010/main" Requires="a14">
+      <mc:AlternateContent xmlns:mc="http://schemas.openxmlformats.org/markup-compatibility/2006" xmlns:a14="http://schemas.microsoft.com/office/drawing/2010/main">
+        <mc:Choice Requires="a14">
           <p:sp>
             <p:nvSpPr>
               <p:cNvPr id="36" name="TextBox 35">
@@ -22516,6 +23882,7 @@
               </a:bodyPr>
               <a:lstStyle/>
               <a:p>
+                <a:pPr/>
                 <a14:m>
                   <m:oMathPara xmlns:m="http://schemas.openxmlformats.org/officeDocument/2006/math">
                     <m:oMathParaPr>
@@ -22877,7 +24244,7 @@
             </p:txBody>
           </p:sp>
         </mc:Choice>
-        <mc:Fallback>
+        <mc:Fallback xmlns="">
           <p:sp>
             <p:nvSpPr>
               <p:cNvPr id="36" name="TextBox 35">
@@ -23012,7 +24379,7 @@
                   <a:schemeClr val="accent1"/>
                 </a:solidFill>
               </a:rPr>
-              <a:t>Calculate mean and variance from elementary effect</a:t>
+              <a:t>Calculate mean, variance from elementary effect and allocate ranking</a:t>
             </a:r>
           </a:p>
         </p:txBody>
@@ -23506,7 +24873,10 @@
           <a:bodyPr/>
           <a:lstStyle/>
           <a:p>
-            <a:endParaRPr lang="en-US"/>
+            <a:r>
+              <a:rPr lang="en-US" dirty="0"/>
+              <a:t>With CO2 Cap</a:t>
+            </a:r>
           </a:p>
         </p:txBody>
       </p:sp>
@@ -23871,8 +25241,8 @@
           </a:prstGeom>
         </p:spPr>
       </p:pic>
-      <mc:AlternateContent xmlns:mc="http://schemas.openxmlformats.org/markup-compatibility/2006">
-        <mc:Choice xmlns:a14="http://schemas.microsoft.com/office/drawing/2010/main" Requires="a14">
+      <mc:AlternateContent xmlns:mc="http://schemas.openxmlformats.org/markup-compatibility/2006" xmlns:a14="http://schemas.microsoft.com/office/drawing/2010/main">
+        <mc:Choice Requires="a14">
           <p:sp>
             <p:nvSpPr>
               <p:cNvPr id="4" name="TextBox 3">
@@ -23901,6 +25271,7 @@
               </a:bodyPr>
               <a:lstStyle/>
               <a:p>
+                <a:pPr/>
                 <a14:m>
                   <m:oMathPara xmlns:m="http://schemas.openxmlformats.org/officeDocument/2006/math">
                     <m:oMathParaPr>
@@ -24262,7 +25633,7 @@
             </p:txBody>
           </p:sp>
         </mc:Choice>
-        <mc:Fallback>
+        <mc:Fallback xmlns="">
           <p:sp>
             <p:nvSpPr>
               <p:cNvPr id="4" name="TextBox 3">

</xml_diff>